<commit_message>
Added database list slide
</commit_message>
<xml_diff>
--- a/slides/20_sql.pptx
+++ b/slides/20_sql.pptx
@@ -9,7 +9,7 @@
     <p:sldMasterId id="2147484133" r:id="rId5"/>
   </p:sldMasterIdLst>
   <p:notesMasterIdLst>
-    <p:notesMasterId r:id="rId20"/>
+    <p:notesMasterId r:id="rId21"/>
   </p:notesMasterIdLst>
   <p:sldIdLst>
     <p:sldId id="885" r:id="rId6"/>
@@ -18,14 +18,15 @@
     <p:sldId id="887" r:id="rId9"/>
     <p:sldId id="888" r:id="rId10"/>
     <p:sldId id="889" r:id="rId11"/>
-    <p:sldId id="890" r:id="rId12"/>
-    <p:sldId id="891" r:id="rId13"/>
-    <p:sldId id="892" r:id="rId14"/>
-    <p:sldId id="893" r:id="rId15"/>
-    <p:sldId id="894" r:id="rId16"/>
-    <p:sldId id="895" r:id="rId17"/>
-    <p:sldId id="896" r:id="rId18"/>
-    <p:sldId id="897" r:id="rId19"/>
+    <p:sldId id="898" r:id="rId12"/>
+    <p:sldId id="890" r:id="rId13"/>
+    <p:sldId id="891" r:id="rId14"/>
+    <p:sldId id="892" r:id="rId15"/>
+    <p:sldId id="893" r:id="rId16"/>
+    <p:sldId id="894" r:id="rId17"/>
+    <p:sldId id="895" r:id="rId18"/>
+    <p:sldId id="896" r:id="rId19"/>
+    <p:sldId id="897" r:id="rId20"/>
   </p:sldIdLst>
   <p:sldSz cx="9363075" cy="5257800"/>
   <p:notesSz cx="6858000" cy="9144000"/>
@@ -843,7 +844,7 @@
             <a:fld id="{ADD4B5B7-85EF-4E48-AC80-2380FACD9C23}" type="slidenum">
               <a:rPr lang="en-US" smtClean="0"/>
               <a:pPr/>
-              <a:t>9</a:t>
+              <a:t>10</a:t>
             </a:fld>
             <a:endParaRPr lang="en-US"/>
           </a:p>
@@ -928,7 +929,7 @@
             <a:fld id="{ADD4B5B7-85EF-4E48-AC80-2380FACD9C23}" type="slidenum">
               <a:rPr lang="en-US" smtClean="0"/>
               <a:pPr/>
-              <a:t>12</a:t>
+              <a:t>13</a:t>
             </a:fld>
             <a:endParaRPr lang="en-US"/>
           </a:p>
@@ -1013,7 +1014,7 @@
             <a:fld id="{ADD4B5B7-85EF-4E48-AC80-2380FACD9C23}" type="slidenum">
               <a:rPr lang="en-US" smtClean="0"/>
               <a:pPr/>
-              <a:t>14</a:t>
+              <a:t>15</a:t>
             </a:fld>
             <a:endParaRPr lang="en-US"/>
           </a:p>
@@ -15288,6 +15289,116 @@
       </p:grpSpPr>
       <p:sp>
         <p:nvSpPr>
+          <p:cNvPr id="2" name="Title 1"/>
+          <p:cNvSpPr>
+            <a:spLocks noGrp="1"/>
+          </p:cNvSpPr>
+          <p:nvPr>
+            <p:ph type="title"/>
+          </p:nvPr>
+        </p:nvSpPr>
+        <p:spPr>
+          <a:xfrm>
+            <a:off x="347663" y="2095500"/>
+            <a:ext cx="8601074" cy="2971800"/>
+          </a:xfrm>
+        </p:spPr>
+        <p:txBody>
+          <a:bodyPr/>
+          <a:lstStyle/>
+          <a:p>
+            <a:pPr>
+              <a:defRPr/>
+            </a:pPr>
+            <a:r>
+              <a:rPr lang="en-US" sz="7500" dirty="0" smtClean="0"/>
+              <a:t>II. Star Schemas</a:t>
+            </a:r>
+            <a:endParaRPr lang="en-US" sz="7500" dirty="0"/>
+          </a:p>
+        </p:txBody>
+      </p:sp>
+      <p:sp>
+        <p:nvSpPr>
+          <p:cNvPr id="4" name="Content Placeholder 3"/>
+          <p:cNvSpPr>
+            <a:spLocks noGrp="1"/>
+          </p:cNvSpPr>
+          <p:nvPr>
+            <p:ph sz="quarter" idx="11"/>
+          </p:nvPr>
+        </p:nvSpPr>
+        <p:spPr>
+          <a:xfrm>
+            <a:off x="371475" y="495300"/>
+            <a:ext cx="6400800" cy="304800"/>
+          </a:xfrm>
+        </p:spPr>
+        <p:txBody>
+          <a:bodyPr wrap="square" lIns="91440" tIns="45720" rIns="91440" bIns="45720" numCol="1" anchor="t" anchorCtr="0" compatLnSpc="1">
+            <a:prstTxWarp prst="textNoShape">
+              <a:avLst/>
+            </a:prstTxWarp>
+          </a:bodyPr>
+          <a:lstStyle/>
+          <a:p>
+            <a:pPr marL="0" indent="0"/>
+            <a:r>
+              <a:rPr lang="en-US" cap="none" dirty="0" smtClean="0">
+                <a:latin typeface="PFDinTextCompPro-Bold" charset="0"/>
+                <a:ea typeface="ヒラギノ角ゴ ProN W3" charset="0"/>
+                <a:cs typeface="ヒラギノ角ゴ ProN W3" charset="0"/>
+              </a:rPr>
+              <a:t>DATA SCIENCE</a:t>
+            </a:r>
+            <a:endParaRPr lang="en-US" cap="none" dirty="0">
+              <a:latin typeface="PFDinTextCompPro-Bold" charset="0"/>
+              <a:ea typeface="ヒラギノ角ゴ ProN W3" charset="0"/>
+              <a:cs typeface="ヒラギノ角ゴ ProN W3" charset="0"/>
+            </a:endParaRPr>
+          </a:p>
+        </p:txBody>
+      </p:sp>
+    </p:spTree>
+    <p:extLst>
+      <p:ext uri="{BB962C8B-B14F-4D97-AF65-F5344CB8AC3E}">
+        <p14:creationId xmlns:p14="http://schemas.microsoft.com/office/powerpoint/2010/main" val="3153614635"/>
+      </p:ext>
+    </p:extLst>
+  </p:cSld>
+  <p:clrMapOvr>
+    <a:masterClrMapping/>
+  </p:clrMapOvr>
+  <p:transition xmlns:p14="http://schemas.microsoft.com/office/powerpoint/2010/main"/>
+  <p:timing>
+    <p:tnLst>
+      <p:par>
+        <p:cTn xmlns:p14="http://schemas.microsoft.com/office/powerpoint/2010/main" id="1" dur="indefinite" restart="never" nodeType="tmRoot"/>
+      </p:par>
+    </p:tnLst>
+  </p:timing>
+</p:sld>
+</file>
+
+<file path=ppt/slides/slide11.xml><?xml version="1.0" encoding="utf-8"?>
+<p:sld xmlns:a="http://schemas.openxmlformats.org/drawingml/2006/main" xmlns:r="http://schemas.openxmlformats.org/officeDocument/2006/relationships" xmlns:p="http://schemas.openxmlformats.org/presentationml/2006/main">
+  <p:cSld>
+    <p:spTree>
+      <p:nvGrpSpPr>
+        <p:cNvPr id="1" name=""/>
+        <p:cNvGrpSpPr/>
+        <p:nvPr/>
+      </p:nvGrpSpPr>
+      <p:grpSpPr>
+        <a:xfrm>
+          <a:off x="0" y="0"/>
+          <a:ext cx="0" cy="0"/>
+          <a:chOff x="0" y="0"/>
+          <a:chExt cx="0" cy="0"/>
+        </a:xfrm>
+      </p:grpSpPr>
+      <p:sp>
+        <p:nvSpPr>
           <p:cNvPr id="3" name="Content Placeholder 2"/>
           <p:cNvSpPr>
             <a:spLocks noGrp="1"/>
@@ -15341,7 +15452,7 @@
               <a:pPr>
                 <a:defRPr/>
               </a:pPr>
-              <a:t>10</a:t>
+              <a:t>11</a:t>
             </a:fld>
             <a:endParaRPr lang="en-US" dirty="0">
               <a:solidFill>
@@ -15643,7 +15754,7 @@
 </p:sld>
 </file>
 
-<file path=ppt/slides/slide11.xml><?xml version="1.0" encoding="utf-8"?>
+<file path=ppt/slides/slide12.xml><?xml version="1.0" encoding="utf-8"?>
 <p:sld xmlns:a="http://schemas.openxmlformats.org/drawingml/2006/main" xmlns:r="http://schemas.openxmlformats.org/officeDocument/2006/relationships" xmlns:p="http://schemas.openxmlformats.org/presentationml/2006/main">
   <p:cSld>
     <p:spTree>
@@ -15739,7 +15850,7 @@
               <a:pPr>
                 <a:defRPr/>
               </a:pPr>
-              <a:t>11</a:t>
+              <a:t>12</a:t>
             </a:fld>
             <a:endParaRPr lang="en-US" dirty="0">
               <a:solidFill>
@@ -15812,7 +15923,7 @@
 </p:sld>
 </file>
 
-<file path=ppt/slides/slide12.xml><?xml version="1.0" encoding="utf-8"?>
+<file path=ppt/slides/slide13.xml><?xml version="1.0" encoding="utf-8"?>
 <p:sld xmlns:a="http://schemas.openxmlformats.org/drawingml/2006/main" xmlns:r="http://schemas.openxmlformats.org/officeDocument/2006/relationships" xmlns:p="http://schemas.openxmlformats.org/presentationml/2006/main">
   <p:cSld>
     <p:spTree>
@@ -15946,7 +16057,7 @@
 </p:sld>
 </file>
 
-<file path=ppt/slides/slide13.xml><?xml version="1.0" encoding="utf-8"?>
+<file path=ppt/slides/slide14.xml><?xml version="1.0" encoding="utf-8"?>
 <p:sld xmlns:a="http://schemas.openxmlformats.org/drawingml/2006/main" xmlns:r="http://schemas.openxmlformats.org/officeDocument/2006/relationships" xmlns:p="http://schemas.openxmlformats.org/presentationml/2006/main">
   <p:cSld>
     <p:spTree>
@@ -16018,7 +16129,7 @@
               <a:pPr>
                 <a:defRPr/>
               </a:pPr>
-              <a:t>13</a:t>
+              <a:t>14</a:t>
             </a:fld>
             <a:endParaRPr lang="en-US" dirty="0">
               <a:solidFill>
@@ -16479,7 +16590,7 @@
 </p:sld>
 </file>
 
-<file path=ppt/slides/slide14.xml><?xml version="1.0" encoding="utf-8"?>
+<file path=ppt/slides/slide15.xml><?xml version="1.0" encoding="utf-8"?>
 <p:sld xmlns:a="http://schemas.openxmlformats.org/drawingml/2006/main" xmlns:r="http://schemas.openxmlformats.org/officeDocument/2006/relationships" xmlns:p="http://schemas.openxmlformats.org/presentationml/2006/main">
   <p:cSld>
     <p:spTree>
@@ -16679,23 +16790,7 @@
                 <a:ea typeface="ヒラギノ角ゴ ProN W6" charset="0"/>
                 <a:cs typeface="ヒラギノ角ゴ ProN W6" charset="0"/>
               </a:rPr>
-              <a:t>I. 	</a:t>
-            </a:r>
-            <a:r>
-              <a:rPr lang="en-US" sz="3000" dirty="0" smtClean="0">
-                <a:latin typeface="PFDinTextCompPro-Bold" charset="0"/>
-                <a:ea typeface="ヒラギノ角ゴ ProN W6" charset="0"/>
-                <a:cs typeface="ヒラギノ角ゴ ProN W6" charset="0"/>
-              </a:rPr>
-              <a:t>Introduction to Databases</a:t>
-            </a:r>
-            <a:r>
-              <a:rPr lang="en-US" sz="3000" dirty="0" smtClean="0">
-                <a:latin typeface="PFDinTextCompPro-Bold" charset="0"/>
-                <a:ea typeface="ヒラギノ角ゴ ProN W6" charset="0"/>
-                <a:cs typeface="ヒラギノ角ゴ ProN W6" charset="0"/>
-              </a:rPr>
-              <a:t/>
+              <a:t>I. 	Introduction to Databases</a:t>
             </a:r>
             <a:br>
               <a:rPr lang="en-US" sz="3000" dirty="0" smtClean="0">
@@ -16710,31 +16805,7 @@
                 <a:ea typeface="ヒラギノ角ゴ ProN W6" charset="0"/>
                 <a:cs typeface="ヒラギノ角ゴ ProN W6" charset="0"/>
               </a:rPr>
-              <a:t>II</a:t>
-            </a:r>
-            <a:r>
-              <a:rPr lang="en-US" sz="3000" dirty="0" smtClean="0">
-                <a:latin typeface="PFDinTextCompPro-Bold" charset="0"/>
-                <a:ea typeface="ヒラギノ角ゴ ProN W6" charset="0"/>
-                <a:cs typeface="ヒラギノ角ゴ ProN W6" charset="0"/>
-              </a:rPr>
-              <a:t>. 	</a:t>
-            </a:r>
-            <a:r>
-              <a:rPr lang="en-US" sz="3000" dirty="0" smtClean="0">
-                <a:latin typeface="PFDinTextCompPro-Bold" charset="0"/>
-                <a:ea typeface="ヒラギノ角ゴ ProN W6" charset="0"/>
-                <a:cs typeface="ヒラギノ角ゴ ProN W6" charset="0"/>
-              </a:rPr>
-              <a:t>Star Schemas</a:t>
-            </a:r>
-            <a:r>
-              <a:rPr lang="en-US" sz="3000" dirty="0" smtClean="0">
-                <a:latin typeface="PFDinTextCompPro-Bold" charset="0"/>
-                <a:ea typeface="ヒラギノ角ゴ ProN W6" charset="0"/>
-                <a:cs typeface="ヒラギノ角ゴ ProN W6" charset="0"/>
-              </a:rPr>
-              <a:t/>
+              <a:t>II. 	Star Schemas</a:t>
             </a:r>
             <a:br>
               <a:rPr lang="en-US" sz="3000" dirty="0" smtClean="0">
@@ -16749,15 +16820,7 @@
                 <a:ea typeface="ヒラギノ角ゴ ProN W6" charset="0"/>
                 <a:cs typeface="ヒラギノ角ゴ ProN W6" charset="0"/>
               </a:rPr>
-              <a:t>III</a:t>
-            </a:r>
-            <a:r>
-              <a:rPr lang="en-US" sz="3000" dirty="0" smtClean="0">
-                <a:latin typeface="PFDinTextCompPro-Bold" charset="0"/>
-                <a:ea typeface="ヒラギノ角ゴ ProN W6" charset="0"/>
-                <a:cs typeface="ヒラギノ角ゴ ProN W6" charset="0"/>
-              </a:rPr>
-              <a:t>. 	</a:t>
+              <a:t>III. 	</a:t>
             </a:r>
             <a:r>
               <a:rPr lang="en-US" sz="3000" dirty="0">
@@ -16780,23 +16843,7 @@
                 <a:ea typeface="ヒラギノ角ゴ ProN W6" charset="0"/>
                 <a:cs typeface="ヒラギノ角ゴ ProN W6" charset="0"/>
               </a:rPr>
-              <a:t>IV</a:t>
-            </a:r>
-            <a:r>
-              <a:rPr lang="en-US" sz="3000" dirty="0" smtClean="0">
-                <a:latin typeface="PFDinTextCompPro-Bold" charset="0"/>
-                <a:ea typeface="ヒラギノ角ゴ ProN W6" charset="0"/>
-                <a:cs typeface="ヒラギノ角ゴ ProN W6" charset="0"/>
-              </a:rPr>
-              <a:t>. 	</a:t>
-            </a:r>
-            <a:r>
-              <a:rPr lang="en-US" sz="3000" dirty="0" smtClean="0">
-                <a:latin typeface="PFDinTextCompPro-Bold" charset="0"/>
-                <a:ea typeface="ヒラギノ角ゴ ProN W6" charset="0"/>
-                <a:cs typeface="ヒラギノ角ゴ ProN W6" charset="0"/>
-              </a:rPr>
-              <a:t>Learning SQL With Code</a:t>
+              <a:t>IV. 	Learning SQL With Code</a:t>
             </a:r>
             <a:endParaRPr lang="en-US" sz="3000" cap="none" dirty="0">
               <a:latin typeface="PFDinTextCompPro-Bold" charset="0"/>
@@ -16945,15 +16992,7 @@
             </a:pPr>
             <a:r>
               <a:rPr lang="en-US" sz="7500" dirty="0" smtClean="0"/>
-              <a:t>I</a:t>
-            </a:r>
-            <a:r>
-              <a:rPr lang="en-US" sz="7500" dirty="0" smtClean="0"/>
-              <a:t>. </a:t>
-            </a:r>
-            <a:r>
-              <a:rPr lang="en-US" sz="7500" dirty="0" smtClean="0"/>
-              <a:t>Introduction to Databases</a:t>
+              <a:t>I. Introduction to Databases</a:t>
             </a:r>
             <a:endParaRPr lang="en-US" sz="7500" dirty="0"/>
           </a:p>
@@ -18898,6 +18937,749 @@
               <a:buChar char="•"/>
             </a:pPr>
             <a:r>
+              <a:rPr lang="en-US" sz="2800" dirty="0" smtClean="0">
+                <a:latin typeface="+mj-lt"/>
+              </a:rPr>
+              <a:t>Today, we’ll be talking about relational databases</a:t>
+            </a:r>
+          </a:p>
+          <a:p>
+            <a:pPr algn="l">
+              <a:buFont typeface="Arial"/>
+              <a:buChar char="•"/>
+            </a:pPr>
+            <a:r>
+              <a:rPr lang="en-US" sz="2800" dirty="0" smtClean="0">
+                <a:latin typeface="+mj-lt"/>
+              </a:rPr>
+              <a:t>Most widely used and most appropriate for many types of data</a:t>
+            </a:r>
+          </a:p>
+          <a:p>
+            <a:pPr algn="l">
+              <a:buFont typeface="Arial"/>
+              <a:buChar char="•"/>
+            </a:pPr>
+            <a:r>
+              <a:rPr lang="en-US" sz="2800" dirty="0" smtClean="0">
+                <a:uFill>
+                  <a:solidFill/>
+                </a:uFill>
+                <a:latin typeface="+mj-lt"/>
+              </a:rPr>
+              <a:t>Popular names</a:t>
+            </a:r>
+          </a:p>
+          <a:p>
+            <a:pPr lvl="1" algn="l">
+              <a:buFont typeface="Arial"/>
+              <a:buChar char="•"/>
+            </a:pPr>
+            <a:r>
+              <a:rPr lang="en-US" sz="2800" dirty="0" smtClean="0">
+                <a:uFill>
+                  <a:solidFill/>
+                </a:uFill>
+                <a:latin typeface="+mj-lt"/>
+              </a:rPr>
+              <a:t>MySQL</a:t>
+            </a:r>
+          </a:p>
+          <a:p>
+            <a:pPr lvl="1" algn="l">
+              <a:buFont typeface="Arial"/>
+              <a:buChar char="•"/>
+            </a:pPr>
+            <a:r>
+              <a:rPr lang="en-US" sz="2800" dirty="0" smtClean="0">
+                <a:uFill>
+                  <a:solidFill/>
+                </a:uFill>
+                <a:latin typeface="+mj-lt"/>
+              </a:rPr>
+              <a:t>Oracle</a:t>
+            </a:r>
+          </a:p>
+          <a:p>
+            <a:pPr lvl="1" algn="l">
+              <a:buFont typeface="Arial"/>
+              <a:buChar char="•"/>
+            </a:pPr>
+            <a:r>
+              <a:rPr lang="en-US" sz="2800" dirty="0" err="1" smtClean="0">
+                <a:uFill>
+                  <a:solidFill/>
+                </a:uFill>
+                <a:latin typeface="+mj-lt"/>
+              </a:rPr>
+              <a:t>Postgres</a:t>
+            </a:r>
+            <a:endParaRPr lang="en-US" sz="2800" dirty="0" smtClean="0">
+              <a:uFill>
+                <a:solidFill/>
+              </a:uFill>
+              <a:latin typeface="+mj-lt"/>
+            </a:endParaRPr>
+          </a:p>
+          <a:p>
+            <a:pPr lvl="1" algn="l">
+              <a:buFont typeface="Arial"/>
+              <a:buChar char="•"/>
+            </a:pPr>
+            <a:r>
+              <a:rPr lang="en-US" sz="2800" dirty="0" smtClean="0">
+                <a:uFill>
+                  <a:solidFill/>
+                </a:uFill>
+                <a:latin typeface="+mj-lt"/>
+              </a:rPr>
+              <a:t>Microsoft </a:t>
+            </a:r>
+            <a:r>
+              <a:rPr lang="en-US" sz="2800" dirty="0">
+                <a:uFill>
+                  <a:solidFill/>
+                </a:uFill>
+                <a:latin typeface="+mj-lt"/>
+              </a:rPr>
+              <a:t>SQL </a:t>
+            </a:r>
+            <a:r>
+              <a:rPr lang="en-US" sz="2800" dirty="0" smtClean="0">
+                <a:uFill>
+                  <a:solidFill/>
+                </a:uFill>
+                <a:latin typeface="+mj-lt"/>
+              </a:rPr>
+              <a:t>Server</a:t>
+            </a:r>
+          </a:p>
+          <a:p>
+            <a:pPr lvl="1" algn="l">
+              <a:buFont typeface="Arial"/>
+              <a:buChar char="•"/>
+            </a:pPr>
+            <a:r>
+              <a:rPr lang="en-US" sz="2800" dirty="0" smtClean="0">
+                <a:uFill>
+                  <a:solidFill/>
+                </a:uFill>
+                <a:latin typeface="+mj-lt"/>
+              </a:rPr>
+              <a:t>SQLite</a:t>
+            </a:r>
+            <a:endParaRPr lang="en-US" sz="2800" dirty="0">
+              <a:uFill>
+                <a:solidFill/>
+              </a:uFill>
+              <a:latin typeface="+mj-lt"/>
+            </a:endParaRPr>
+          </a:p>
+          <a:p>
+            <a:pPr algn="l">
+              <a:buFont typeface="Arial"/>
+              <a:buChar char="•"/>
+            </a:pPr>
+            <a:endParaRPr sz="2800" dirty="0">
+              <a:latin typeface="+mj-lt"/>
+            </a:endParaRPr>
+          </a:p>
+        </p:txBody>
+      </p:sp>
+      <p:sp>
+        <p:nvSpPr>
+          <p:cNvPr id="7" name="Content Placeholder 2"/>
+          <p:cNvSpPr>
+            <a:spLocks noGrp="1"/>
+          </p:cNvSpPr>
+          <p:nvPr>
+            <p:ph sz="quarter" idx="11"/>
+          </p:nvPr>
+        </p:nvSpPr>
+        <p:spPr>
+          <a:xfrm>
+            <a:off x="371266" y="1257300"/>
+            <a:ext cx="7129671" cy="304800"/>
+          </a:xfrm>
+        </p:spPr>
+        <p:txBody>
+          <a:bodyPr/>
+          <a:lstStyle/>
+          <a:p>
+            <a:r>
+              <a:rPr lang="en-US" sz="4800" dirty="0" smtClean="0">
+                <a:latin typeface="PFDinTextCompPro-Bold" charset="0"/>
+                <a:ea typeface="ヒラギノ角ゴ ProN W6" charset="0"/>
+                <a:cs typeface="ヒラギノ角ゴ ProN W6" charset="0"/>
+              </a:rPr>
+              <a:t>Relational VS. </a:t>
+            </a:r>
+            <a:r>
+              <a:rPr lang="en-US" sz="4800" dirty="0" err="1" smtClean="0">
+                <a:latin typeface="PFDinTextCompPro-Bold" charset="0"/>
+                <a:ea typeface="ヒラギノ角ゴ ProN W6" charset="0"/>
+                <a:cs typeface="ヒラギノ角ゴ ProN W6" charset="0"/>
+              </a:rPr>
+              <a:t>NoSQL</a:t>
+            </a:r>
+            <a:endParaRPr lang="en-US" sz="4400" dirty="0"/>
+          </a:p>
+        </p:txBody>
+      </p:sp>
+    </p:spTree>
+    <p:extLst>
+      <p:ext uri="{BB962C8B-B14F-4D97-AF65-F5344CB8AC3E}">
+        <p14:creationId xmlns:p14="http://schemas.microsoft.com/office/powerpoint/2010/main" val="3467459524"/>
+      </p:ext>
+    </p:extLst>
+  </p:cSld>
+  <p:clrMapOvr>
+    <a:masterClrMapping/>
+  </p:clrMapOvr>
+  <mc:AlternateContent xmlns:mc="http://schemas.openxmlformats.org/markup-compatibility/2006" xmlns:p14="http://schemas.microsoft.com/office/powerpoint/2010/main">
+    <mc:Choice Requires="p14">
+      <p:transition p14:dur="100">
+        <p:cut/>
+      </p:transition>
+    </mc:Choice>
+    <mc:Fallback xmlns="">
+      <p:transition xmlns:p14="http://schemas.microsoft.com/office/powerpoint/2010/main">
+        <p:cut/>
+      </p:transition>
+    </mc:Fallback>
+  </mc:AlternateContent>
+  <p:timing>
+    <p:tnLst>
+      <p:par>
+        <p:cTn xmlns:p14="http://schemas.microsoft.com/office/powerpoint/2010/main" id="1" dur="indefinite" restart="never" nodeType="tmRoot">
+          <p:childTnLst>
+            <p:seq concurrent="1" nextAc="seek">
+              <p:cTn id="2" dur="indefinite" nodeType="mainSeq">
+                <p:childTnLst>
+                  <p:par>
+                    <p:cTn id="3" fill="hold">
+                      <p:stCondLst>
+                        <p:cond delay="indefinite"/>
+                      </p:stCondLst>
+                      <p:childTnLst>
+                        <p:par>
+                          <p:cTn id="4" fill="hold">
+                            <p:stCondLst>
+                              <p:cond delay="0"/>
+                            </p:stCondLst>
+                            <p:childTnLst>
+                              <p:par>
+                                <p:cTn id="5" presetID="1" presetClass="entr" presetSubtype="0" fill="hold" nodeType="clickEffect">
+                                  <p:stCondLst>
+                                    <p:cond delay="0"/>
+                                  </p:stCondLst>
+                                  <p:childTnLst>
+                                    <p:set>
+                                      <p:cBhvr>
+                                        <p:cTn id="6" dur="1" fill="hold">
+                                          <p:stCondLst>
+                                            <p:cond delay="0"/>
+                                          </p:stCondLst>
+                                        </p:cTn>
+                                        <p:tgtEl>
+                                          <p:spTgt spid="6">
+                                            <p:txEl>
+                                              <p:pRg st="0" end="0"/>
+                                            </p:txEl>
+                                          </p:spTgt>
+                                        </p:tgtEl>
+                                        <p:attrNameLst>
+                                          <p:attrName>style.visibility</p:attrName>
+                                        </p:attrNameLst>
+                                      </p:cBhvr>
+                                      <p:to>
+                                        <p:strVal val="visible"/>
+                                      </p:to>
+                                    </p:set>
+                                  </p:childTnLst>
+                                </p:cTn>
+                              </p:par>
+                            </p:childTnLst>
+                          </p:cTn>
+                        </p:par>
+                      </p:childTnLst>
+                    </p:cTn>
+                  </p:par>
+                  <p:par>
+                    <p:cTn id="7" fill="hold">
+                      <p:stCondLst>
+                        <p:cond delay="indefinite"/>
+                      </p:stCondLst>
+                      <p:childTnLst>
+                        <p:par>
+                          <p:cTn id="8" fill="hold">
+                            <p:stCondLst>
+                              <p:cond delay="0"/>
+                            </p:stCondLst>
+                            <p:childTnLst>
+                              <p:par>
+                                <p:cTn id="9" presetID="1" presetClass="entr" presetSubtype="0" fill="hold" nodeType="clickEffect">
+                                  <p:stCondLst>
+                                    <p:cond delay="0"/>
+                                  </p:stCondLst>
+                                  <p:childTnLst>
+                                    <p:set>
+                                      <p:cBhvr>
+                                        <p:cTn id="10" dur="1" fill="hold">
+                                          <p:stCondLst>
+                                            <p:cond delay="0"/>
+                                          </p:stCondLst>
+                                        </p:cTn>
+                                        <p:tgtEl>
+                                          <p:spTgt spid="6">
+                                            <p:txEl>
+                                              <p:pRg st="1" end="1"/>
+                                            </p:txEl>
+                                          </p:spTgt>
+                                        </p:tgtEl>
+                                        <p:attrNameLst>
+                                          <p:attrName>style.visibility</p:attrName>
+                                        </p:attrNameLst>
+                                      </p:cBhvr>
+                                      <p:to>
+                                        <p:strVal val="visible"/>
+                                      </p:to>
+                                    </p:set>
+                                  </p:childTnLst>
+                                </p:cTn>
+                              </p:par>
+                            </p:childTnLst>
+                          </p:cTn>
+                        </p:par>
+                      </p:childTnLst>
+                    </p:cTn>
+                  </p:par>
+                  <p:par>
+                    <p:cTn id="11" fill="hold">
+                      <p:stCondLst>
+                        <p:cond delay="indefinite"/>
+                      </p:stCondLst>
+                      <p:childTnLst>
+                        <p:par>
+                          <p:cTn id="12" fill="hold">
+                            <p:stCondLst>
+                              <p:cond delay="0"/>
+                            </p:stCondLst>
+                            <p:childTnLst>
+                              <p:par>
+                                <p:cTn id="13" presetID="1" presetClass="entr" presetSubtype="0" fill="hold" nodeType="clickEffect">
+                                  <p:stCondLst>
+                                    <p:cond delay="0"/>
+                                  </p:stCondLst>
+                                  <p:childTnLst>
+                                    <p:set>
+                                      <p:cBhvr>
+                                        <p:cTn id="14" dur="1" fill="hold">
+                                          <p:stCondLst>
+                                            <p:cond delay="0"/>
+                                          </p:stCondLst>
+                                        </p:cTn>
+                                        <p:tgtEl>
+                                          <p:spTgt spid="6">
+                                            <p:txEl>
+                                              <p:pRg st="2" end="2"/>
+                                            </p:txEl>
+                                          </p:spTgt>
+                                        </p:tgtEl>
+                                        <p:attrNameLst>
+                                          <p:attrName>style.visibility</p:attrName>
+                                        </p:attrNameLst>
+                                      </p:cBhvr>
+                                      <p:to>
+                                        <p:strVal val="visible"/>
+                                      </p:to>
+                                    </p:set>
+                                  </p:childTnLst>
+                                </p:cTn>
+                              </p:par>
+                            </p:childTnLst>
+                          </p:cTn>
+                        </p:par>
+                      </p:childTnLst>
+                    </p:cTn>
+                  </p:par>
+                  <p:par>
+                    <p:cTn id="15" fill="hold">
+                      <p:stCondLst>
+                        <p:cond delay="indefinite"/>
+                      </p:stCondLst>
+                      <p:childTnLst>
+                        <p:par>
+                          <p:cTn id="16" fill="hold">
+                            <p:stCondLst>
+                              <p:cond delay="0"/>
+                            </p:stCondLst>
+                            <p:childTnLst>
+                              <p:par>
+                                <p:cTn id="17" presetID="1" presetClass="entr" presetSubtype="0" fill="hold" nodeType="clickEffect">
+                                  <p:stCondLst>
+                                    <p:cond delay="0"/>
+                                  </p:stCondLst>
+                                  <p:childTnLst>
+                                    <p:set>
+                                      <p:cBhvr>
+                                        <p:cTn id="18" dur="1" fill="hold">
+                                          <p:stCondLst>
+                                            <p:cond delay="0"/>
+                                          </p:stCondLst>
+                                        </p:cTn>
+                                        <p:tgtEl>
+                                          <p:spTgt spid="6">
+                                            <p:txEl>
+                                              <p:pRg st="3" end="3"/>
+                                            </p:txEl>
+                                          </p:spTgt>
+                                        </p:tgtEl>
+                                        <p:attrNameLst>
+                                          <p:attrName>style.visibility</p:attrName>
+                                        </p:attrNameLst>
+                                      </p:cBhvr>
+                                      <p:to>
+                                        <p:strVal val="visible"/>
+                                      </p:to>
+                                    </p:set>
+                                  </p:childTnLst>
+                                </p:cTn>
+                              </p:par>
+                            </p:childTnLst>
+                          </p:cTn>
+                        </p:par>
+                      </p:childTnLst>
+                    </p:cTn>
+                  </p:par>
+                  <p:par>
+                    <p:cTn id="19" fill="hold">
+                      <p:stCondLst>
+                        <p:cond delay="indefinite"/>
+                      </p:stCondLst>
+                      <p:childTnLst>
+                        <p:par>
+                          <p:cTn id="20" fill="hold">
+                            <p:stCondLst>
+                              <p:cond delay="0"/>
+                            </p:stCondLst>
+                            <p:childTnLst>
+                              <p:par>
+                                <p:cTn id="21" presetID="1" presetClass="entr" presetSubtype="0" fill="hold" nodeType="clickEffect">
+                                  <p:stCondLst>
+                                    <p:cond delay="0"/>
+                                  </p:stCondLst>
+                                  <p:childTnLst>
+                                    <p:set>
+                                      <p:cBhvr>
+                                        <p:cTn id="22" dur="1" fill="hold">
+                                          <p:stCondLst>
+                                            <p:cond delay="0"/>
+                                          </p:stCondLst>
+                                        </p:cTn>
+                                        <p:tgtEl>
+                                          <p:spTgt spid="6">
+                                            <p:txEl>
+                                              <p:pRg st="4" end="4"/>
+                                            </p:txEl>
+                                          </p:spTgt>
+                                        </p:tgtEl>
+                                        <p:attrNameLst>
+                                          <p:attrName>style.visibility</p:attrName>
+                                        </p:attrNameLst>
+                                      </p:cBhvr>
+                                      <p:to>
+                                        <p:strVal val="visible"/>
+                                      </p:to>
+                                    </p:set>
+                                  </p:childTnLst>
+                                </p:cTn>
+                              </p:par>
+                            </p:childTnLst>
+                          </p:cTn>
+                        </p:par>
+                      </p:childTnLst>
+                    </p:cTn>
+                  </p:par>
+                  <p:par>
+                    <p:cTn id="23" fill="hold">
+                      <p:stCondLst>
+                        <p:cond delay="indefinite"/>
+                      </p:stCondLst>
+                      <p:childTnLst>
+                        <p:par>
+                          <p:cTn id="24" fill="hold">
+                            <p:stCondLst>
+                              <p:cond delay="0"/>
+                            </p:stCondLst>
+                            <p:childTnLst>
+                              <p:par>
+                                <p:cTn id="25" presetID="1" presetClass="entr" presetSubtype="0" fill="hold" nodeType="clickEffect">
+                                  <p:stCondLst>
+                                    <p:cond delay="0"/>
+                                  </p:stCondLst>
+                                  <p:childTnLst>
+                                    <p:set>
+                                      <p:cBhvr>
+                                        <p:cTn id="26" dur="1" fill="hold">
+                                          <p:stCondLst>
+                                            <p:cond delay="0"/>
+                                          </p:stCondLst>
+                                        </p:cTn>
+                                        <p:tgtEl>
+                                          <p:spTgt spid="6">
+                                            <p:txEl>
+                                              <p:pRg st="5" end="5"/>
+                                            </p:txEl>
+                                          </p:spTgt>
+                                        </p:tgtEl>
+                                        <p:attrNameLst>
+                                          <p:attrName>style.visibility</p:attrName>
+                                        </p:attrNameLst>
+                                      </p:cBhvr>
+                                      <p:to>
+                                        <p:strVal val="visible"/>
+                                      </p:to>
+                                    </p:set>
+                                  </p:childTnLst>
+                                </p:cTn>
+                              </p:par>
+                            </p:childTnLst>
+                          </p:cTn>
+                        </p:par>
+                      </p:childTnLst>
+                    </p:cTn>
+                  </p:par>
+                  <p:par>
+                    <p:cTn id="27" fill="hold">
+                      <p:stCondLst>
+                        <p:cond delay="indefinite"/>
+                      </p:stCondLst>
+                      <p:childTnLst>
+                        <p:par>
+                          <p:cTn id="28" fill="hold">
+                            <p:stCondLst>
+                              <p:cond delay="0"/>
+                            </p:stCondLst>
+                            <p:childTnLst>
+                              <p:par>
+                                <p:cTn id="29" presetID="1" presetClass="entr" presetSubtype="0" fill="hold" nodeType="clickEffect">
+                                  <p:stCondLst>
+                                    <p:cond delay="0"/>
+                                  </p:stCondLst>
+                                  <p:childTnLst>
+                                    <p:set>
+                                      <p:cBhvr>
+                                        <p:cTn id="30" dur="1" fill="hold">
+                                          <p:stCondLst>
+                                            <p:cond delay="0"/>
+                                          </p:stCondLst>
+                                        </p:cTn>
+                                        <p:tgtEl>
+                                          <p:spTgt spid="6">
+                                            <p:txEl>
+                                              <p:pRg st="6" end="6"/>
+                                            </p:txEl>
+                                          </p:spTgt>
+                                        </p:tgtEl>
+                                        <p:attrNameLst>
+                                          <p:attrName>style.visibility</p:attrName>
+                                        </p:attrNameLst>
+                                      </p:cBhvr>
+                                      <p:to>
+                                        <p:strVal val="visible"/>
+                                      </p:to>
+                                    </p:set>
+                                  </p:childTnLst>
+                                </p:cTn>
+                              </p:par>
+                            </p:childTnLst>
+                          </p:cTn>
+                        </p:par>
+                      </p:childTnLst>
+                    </p:cTn>
+                  </p:par>
+                  <p:par>
+                    <p:cTn id="31" fill="hold">
+                      <p:stCondLst>
+                        <p:cond delay="indefinite"/>
+                      </p:stCondLst>
+                      <p:childTnLst>
+                        <p:par>
+                          <p:cTn id="32" fill="hold">
+                            <p:stCondLst>
+                              <p:cond delay="0"/>
+                            </p:stCondLst>
+                            <p:childTnLst>
+                              <p:par>
+                                <p:cTn id="33" presetID="1" presetClass="entr" presetSubtype="0" fill="hold" nodeType="clickEffect">
+                                  <p:stCondLst>
+                                    <p:cond delay="0"/>
+                                  </p:stCondLst>
+                                  <p:childTnLst>
+                                    <p:set>
+                                      <p:cBhvr>
+                                        <p:cTn id="34" dur="1" fill="hold">
+                                          <p:stCondLst>
+                                            <p:cond delay="0"/>
+                                          </p:stCondLst>
+                                        </p:cTn>
+                                        <p:tgtEl>
+                                          <p:spTgt spid="6">
+                                            <p:txEl>
+                                              <p:pRg st="7" end="7"/>
+                                            </p:txEl>
+                                          </p:spTgt>
+                                        </p:tgtEl>
+                                        <p:attrNameLst>
+                                          <p:attrName>style.visibility</p:attrName>
+                                        </p:attrNameLst>
+                                      </p:cBhvr>
+                                      <p:to>
+                                        <p:strVal val="visible"/>
+                                      </p:to>
+                                    </p:set>
+                                  </p:childTnLst>
+                                </p:cTn>
+                              </p:par>
+                            </p:childTnLst>
+                          </p:cTn>
+                        </p:par>
+                      </p:childTnLst>
+                    </p:cTn>
+                  </p:par>
+                </p:childTnLst>
+              </p:cTn>
+              <p:prevCondLst>
+                <p:cond evt="onPrev" delay="0">
+                  <p:tgtEl>
+                    <p:sldTgt/>
+                  </p:tgtEl>
+                </p:cond>
+              </p:prevCondLst>
+              <p:nextCondLst>
+                <p:cond evt="onNext" delay="0">
+                  <p:tgtEl>
+                    <p:sldTgt/>
+                  </p:tgtEl>
+                </p:cond>
+              </p:nextCondLst>
+            </p:seq>
+          </p:childTnLst>
+        </p:cTn>
+      </p:par>
+    </p:tnLst>
+  </p:timing>
+</p:sld>
+</file>
+
+<file path=ppt/slides/slide8.xml><?xml version="1.0" encoding="utf-8"?>
+<p:sld xmlns:a="http://schemas.openxmlformats.org/drawingml/2006/main" xmlns:r="http://schemas.openxmlformats.org/officeDocument/2006/relationships" xmlns:p="http://schemas.openxmlformats.org/presentationml/2006/main">
+  <p:cSld>
+    <p:spTree>
+      <p:nvGrpSpPr>
+        <p:cNvPr id="1" name=""/>
+        <p:cNvGrpSpPr/>
+        <p:nvPr/>
+      </p:nvGrpSpPr>
+      <p:grpSpPr>
+        <a:xfrm>
+          <a:off x="0" y="0"/>
+          <a:ext cx="0" cy="0"/>
+          <a:chOff x="0" y="0"/>
+          <a:chExt cx="0" cy="0"/>
+        </a:xfrm>
+      </p:grpSpPr>
+      <p:sp>
+        <p:nvSpPr>
+          <p:cNvPr id="3" name="Content Placeholder 2"/>
+          <p:cNvSpPr>
+            <a:spLocks noGrp="1"/>
+          </p:cNvSpPr>
+          <p:nvPr>
+            <p:ph sz="quarter" idx="11"/>
+          </p:nvPr>
+        </p:nvSpPr>
+        <p:spPr/>
+        <p:txBody>
+          <a:bodyPr/>
+          <a:lstStyle/>
+          <a:p>
+            <a:r>
+              <a:rPr lang="en-US" sz="2400" dirty="0" smtClean="0">
+                <a:latin typeface="PFDinTextCompPro-Bold" charset="0"/>
+                <a:ea typeface="ヒラギノ角ゴ ProN W6" charset="0"/>
+                <a:cs typeface="ヒラギノ角ゴ ProN W6" charset="0"/>
+              </a:rPr>
+              <a:t>Introduction to Databases</a:t>
+            </a:r>
+            <a:endParaRPr lang="en-US" dirty="0"/>
+          </a:p>
+        </p:txBody>
+      </p:sp>
+      <p:sp>
+        <p:nvSpPr>
+          <p:cNvPr id="5" name="Slide Number Placeholder 4"/>
+          <p:cNvSpPr>
+            <a:spLocks noGrp="1"/>
+          </p:cNvSpPr>
+          <p:nvPr>
+            <p:ph type="sldNum" sz="quarter" idx="13"/>
+          </p:nvPr>
+        </p:nvSpPr>
+        <p:spPr/>
+        <p:txBody>
+          <a:bodyPr/>
+          <a:lstStyle/>
+          <a:p>
+            <a:pPr>
+              <a:defRPr/>
+            </a:pPr>
+            <a:fld id="{BD34588A-CBAF-924B-A77D-DE72B91A9204}" type="slidenum">
+              <a:rPr lang="en-US" smtClean="0">
+                <a:solidFill>
+                  <a:srgbClr val="000000"/>
+                </a:solidFill>
+                <a:latin typeface="PFDinTextCompPro-Bold"/>
+              </a:rPr>
+              <a:pPr>
+                <a:defRPr/>
+              </a:pPr>
+              <a:t>8</a:t>
+            </a:fld>
+            <a:endParaRPr lang="en-US" dirty="0">
+              <a:solidFill>
+                <a:srgbClr val="000000"/>
+              </a:solidFill>
+              <a:latin typeface="PFDinTextCompPro-Bold"/>
+            </a:endParaRPr>
+          </a:p>
+        </p:txBody>
+      </p:sp>
+      <p:sp>
+        <p:nvSpPr>
+          <p:cNvPr id="6" name="TextShape 2"/>
+          <p:cNvSpPr txBox="1"/>
+          <p:nvPr/>
+        </p:nvSpPr>
+        <p:spPr>
+          <a:xfrm>
+            <a:off x="414337" y="1714500"/>
+            <a:ext cx="8426399" cy="2981916"/>
+          </a:xfrm>
+          <a:prstGeom prst="rect">
+            <a:avLst/>
+          </a:prstGeom>
+        </p:spPr>
+        <p:txBody>
+          <a:bodyPr/>
+          <a:lstStyle/>
+          <a:p>
+            <a:pPr algn="l">
+              <a:buFont typeface="Arial"/>
+              <a:buChar char="•"/>
+            </a:pPr>
+            <a:r>
               <a:rPr lang="en-US" sz="3200" dirty="0" smtClean="0">
                 <a:latin typeface="PFDinTextCompPro-Bold"/>
               </a:rPr>
@@ -19228,7 +20010,7 @@
 </p:sld>
 </file>
 
-<file path=ppt/slides/slide8.xml><?xml version="1.0" encoding="utf-8"?>
+<file path=ppt/slides/slide9.xml><?xml version="1.0" encoding="utf-8"?>
 <p:sld xmlns:a="http://schemas.openxmlformats.org/drawingml/2006/main" xmlns:r="http://schemas.openxmlformats.org/officeDocument/2006/relationships" xmlns:p="http://schemas.openxmlformats.org/presentationml/2006/main">
   <p:cSld>
     <p:spTree>
@@ -19300,7 +20082,7 @@
               <a:pPr>
                 <a:defRPr/>
               </a:pPr>
-              <a:t>8</a:t>
+              <a:t>9</a:t>
             </a:fld>
             <a:endParaRPr lang="en-US" dirty="0">
               <a:solidFill>
@@ -19860,116 +20642,6 @@
             </p:seq>
           </p:childTnLst>
         </p:cTn>
-      </p:par>
-    </p:tnLst>
-  </p:timing>
-</p:sld>
-</file>
-
-<file path=ppt/slides/slide9.xml><?xml version="1.0" encoding="utf-8"?>
-<p:sld xmlns:a="http://schemas.openxmlformats.org/drawingml/2006/main" xmlns:r="http://schemas.openxmlformats.org/officeDocument/2006/relationships" xmlns:p="http://schemas.openxmlformats.org/presentationml/2006/main">
-  <p:cSld>
-    <p:spTree>
-      <p:nvGrpSpPr>
-        <p:cNvPr id="1" name=""/>
-        <p:cNvGrpSpPr/>
-        <p:nvPr/>
-      </p:nvGrpSpPr>
-      <p:grpSpPr>
-        <a:xfrm>
-          <a:off x="0" y="0"/>
-          <a:ext cx="0" cy="0"/>
-          <a:chOff x="0" y="0"/>
-          <a:chExt cx="0" cy="0"/>
-        </a:xfrm>
-      </p:grpSpPr>
-      <p:sp>
-        <p:nvSpPr>
-          <p:cNvPr id="2" name="Title 1"/>
-          <p:cNvSpPr>
-            <a:spLocks noGrp="1"/>
-          </p:cNvSpPr>
-          <p:nvPr>
-            <p:ph type="title"/>
-          </p:nvPr>
-        </p:nvSpPr>
-        <p:spPr>
-          <a:xfrm>
-            <a:off x="347663" y="2095500"/>
-            <a:ext cx="8601074" cy="2971800"/>
-          </a:xfrm>
-        </p:spPr>
-        <p:txBody>
-          <a:bodyPr/>
-          <a:lstStyle/>
-          <a:p>
-            <a:pPr>
-              <a:defRPr/>
-            </a:pPr>
-            <a:r>
-              <a:rPr lang="en-US" sz="7500" dirty="0" smtClean="0"/>
-              <a:t>II. Star Schemas</a:t>
-            </a:r>
-            <a:endParaRPr lang="en-US" sz="7500" dirty="0"/>
-          </a:p>
-        </p:txBody>
-      </p:sp>
-      <p:sp>
-        <p:nvSpPr>
-          <p:cNvPr id="4" name="Content Placeholder 3"/>
-          <p:cNvSpPr>
-            <a:spLocks noGrp="1"/>
-          </p:cNvSpPr>
-          <p:nvPr>
-            <p:ph sz="quarter" idx="11"/>
-          </p:nvPr>
-        </p:nvSpPr>
-        <p:spPr>
-          <a:xfrm>
-            <a:off x="371475" y="495300"/>
-            <a:ext cx="6400800" cy="304800"/>
-          </a:xfrm>
-        </p:spPr>
-        <p:txBody>
-          <a:bodyPr wrap="square" lIns="91440" tIns="45720" rIns="91440" bIns="45720" numCol="1" anchor="t" anchorCtr="0" compatLnSpc="1">
-            <a:prstTxWarp prst="textNoShape">
-              <a:avLst/>
-            </a:prstTxWarp>
-          </a:bodyPr>
-          <a:lstStyle/>
-          <a:p>
-            <a:pPr marL="0" indent="0"/>
-            <a:r>
-              <a:rPr lang="en-US" cap="none" dirty="0" smtClean="0">
-                <a:latin typeface="PFDinTextCompPro-Bold" charset="0"/>
-                <a:ea typeface="ヒラギノ角ゴ ProN W3" charset="0"/>
-                <a:cs typeface="ヒラギノ角ゴ ProN W3" charset="0"/>
-              </a:rPr>
-              <a:t>DATA SCIENCE</a:t>
-            </a:r>
-            <a:endParaRPr lang="en-US" cap="none" dirty="0">
-              <a:latin typeface="PFDinTextCompPro-Bold" charset="0"/>
-              <a:ea typeface="ヒラギノ角ゴ ProN W3" charset="0"/>
-              <a:cs typeface="ヒラギノ角ゴ ProN W3" charset="0"/>
-            </a:endParaRPr>
-          </a:p>
-        </p:txBody>
-      </p:sp>
-    </p:spTree>
-    <p:extLst>
-      <p:ext uri="{BB962C8B-B14F-4D97-AF65-F5344CB8AC3E}">
-        <p14:creationId xmlns:p14="http://schemas.microsoft.com/office/powerpoint/2010/main" val="3153614635"/>
-      </p:ext>
-    </p:extLst>
-  </p:cSld>
-  <p:clrMapOvr>
-    <a:masterClrMapping/>
-  </p:clrMapOvr>
-  <p:transition xmlns:p14="http://schemas.microsoft.com/office/powerpoint/2010/main"/>
-  <p:timing>
-    <p:tnLst>
-      <p:par>
-        <p:cTn xmlns:p14="http://schemas.microsoft.com/office/powerpoint/2010/main" id="1" dur="indefinite" restart="never" nodeType="tmRoot"/>
       </p:par>
     </p:tnLst>
   </p:timing>

</xml_diff>